<commit_message>
Add some in-line code to "writing a task.pptx"
</commit_message>
<xml_diff>
--- a/documents/writing a task.pptx
+++ b/documents/writing a task.pptx
@@ -5,10 +5,10 @@
     <p:sldMasterId id="2147483661" r:id="rId1"/>
   </p:sldMasterIdLst>
   <p:notesMasterIdLst>
-    <p:notesMasterId r:id="rId14"/>
+    <p:notesMasterId r:id="rId16"/>
   </p:notesMasterIdLst>
   <p:handoutMasterIdLst>
-    <p:handoutMasterId r:id="rId15"/>
+    <p:handoutMasterId r:id="rId17"/>
   </p:handoutMasterIdLst>
   <p:sldIdLst>
     <p:sldId id="257" r:id="rId2"/>
@@ -18,11 +18,13 @@
     <p:sldId id="263" r:id="rId6"/>
     <p:sldId id="264" r:id="rId7"/>
     <p:sldId id="265" r:id="rId8"/>
-    <p:sldId id="266" r:id="rId9"/>
-    <p:sldId id="267" r:id="rId10"/>
-    <p:sldId id="269" r:id="rId11"/>
-    <p:sldId id="270" r:id="rId12"/>
-    <p:sldId id="271" r:id="rId13"/>
+    <p:sldId id="270" r:id="rId9"/>
+    <p:sldId id="266" r:id="rId10"/>
+    <p:sldId id="272" r:id="rId11"/>
+    <p:sldId id="273" r:id="rId12"/>
+    <p:sldId id="267" r:id="rId13"/>
+    <p:sldId id="269" r:id="rId14"/>
+    <p:sldId id="271" r:id="rId15"/>
   </p:sldIdLst>
   <p:sldSz cx="9144000" cy="6858000" type="screen4x3"/>
   <p:notesSz cx="6858000" cy="9144000"/>
@@ -207,7 +209,7 @@
             <a:fld id="{292420C5-2895-F740-82DD-84BEAA3AC837}" type="datetimeFigureOut">
               <a:rPr lang="en-US" smtClean="0"/>
               <a:pPr/>
-              <a:t>10/1/15</a:t>
+              <a:t>10/6/15</a:t>
             </a:fld>
             <a:endParaRPr lang="en-US"/>
           </a:p>
@@ -373,7 +375,7 @@
           <a:p>
             <a:fld id="{72B6465E-D10D-4748-85F3-8D281D805233}" type="datetimeFigureOut">
               <a:rPr lang="en-US" smtClean="0"/>
-              <a:t>10/1/15</a:t>
+              <a:t>10/6/15</a:t>
             </a:fld>
             <a:endParaRPr lang="en-US"/>
           </a:p>
@@ -2138,7 +2140,7 @@
           <a:p>
             <a:r>
               <a:rPr lang="en-US" dirty="0" smtClean="0"/>
-              <a:t>New Dataset Types</a:t>
+              <a:t>Argument Parser: Changing the Dataset Type</a:t>
             </a:r>
             <a:endParaRPr lang="en-US" dirty="0"/>
           </a:p>
@@ -2163,95 +2165,399 @@
               <a:buNone/>
             </a:pPr>
             <a:r>
-              <a:rPr lang="en-US" dirty="0" smtClean="0"/>
-              <a:t>At present each </a:t>
-            </a:r>
-            <a:r>
-              <a:rPr lang="en-US" dirty="0" smtClean="0"/>
-              <a:t>camera mapper provides a specific set of dataset </a:t>
-            </a:r>
-            <a:r>
-              <a:rPr lang="en-US" dirty="0" smtClean="0"/>
-              <a:t>types and if </a:t>
-            </a:r>
-            <a:r>
-              <a:rPr lang="en-US" dirty="0" smtClean="0"/>
-              <a:t>your task wants to write new kinds of data you will have to update the camera mapper for each camera you care </a:t>
-            </a:r>
-            <a:r>
-              <a:rPr lang="en-US" dirty="0" smtClean="0"/>
-              <a:t>about. Adding dataset types is </a:t>
-            </a:r>
-            <a:r>
-              <a:rPr lang="en-US" dirty="0" smtClean="0"/>
-              <a:t>discussed in the talk on </a:t>
+              <a:rPr lang="en-US" dirty="0"/>
+              <a:t>Changing the </a:t>
+            </a:r>
+            <a:r>
+              <a:rPr lang="en-US" dirty="0" smtClean="0"/>
+              <a:t>dataset type </a:t>
+            </a:r>
+            <a:r>
+              <a:rPr lang="en-US" dirty="0"/>
+              <a:t>is </a:t>
+            </a:r>
+            <a:r>
+              <a:rPr lang="en-US" dirty="0" smtClean="0"/>
+              <a:t>easy.</a:t>
+            </a:r>
+            <a:r>
+              <a:rPr lang="en-US" dirty="0"/>
+              <a:t> </a:t>
+            </a:r>
+            <a:r>
+              <a:rPr lang="en-US" dirty="0" smtClean="0"/>
+              <a:t>For example </a:t>
+            </a:r>
+            <a:r>
+              <a:rPr lang="en-US" dirty="0" smtClean="0">
+                <a:hlinkClick r:id="rId2"/>
+              </a:rPr>
+              <a:t>ProcessCoaddTask</a:t>
+            </a:r>
+            <a:r>
+              <a:rPr lang="en-US" dirty="0" smtClean="0"/>
+              <a:t> wants a </a:t>
             </a:r>
             <a:r>
               <a:rPr lang="en-US" dirty="0" err="1" smtClean="0"/>
-              <a:t>obs</a:t>
-            </a:r>
-            <a:r>
-              <a:rPr lang="en-US" dirty="0" smtClean="0"/>
-              <a:t> packages</a:t>
-            </a:r>
-            <a:r>
-              <a:rPr lang="en-US" dirty="0" smtClean="0"/>
-              <a:t>.</a:t>
-            </a:r>
+              <a:t>coadd</a:t>
+            </a:r>
+            <a:r>
+              <a:rPr lang="en-US" dirty="0"/>
+              <a:t> </a:t>
+            </a:r>
+            <a:r>
+              <a:rPr lang="en-US" dirty="0" smtClean="0"/>
+              <a:t>instead of a raw image:</a:t>
+            </a:r>
+          </a:p>
+          <a:p>
+            <a:endParaRPr lang="en-US" dirty="0" smtClean="0"/>
           </a:p>
           <a:p>
             <a:pPr marL="0" indent="0">
               <a:buNone/>
             </a:pPr>
-            <a:endParaRPr lang="en-US" dirty="0"/>
+            <a:r>
+              <a:rPr lang="en-US" sz="1800" dirty="0" smtClean="0">
+                <a:latin typeface="Monaco"/>
+                <a:cs typeface="Monaco"/>
+              </a:rPr>
+              <a:t>class </a:t>
+            </a:r>
+            <a:r>
+              <a:rPr lang="en-US" sz="1800" dirty="0" err="1">
+                <a:latin typeface="Monaco"/>
+                <a:cs typeface="Monaco"/>
+              </a:rPr>
+              <a:t>ProcessCoaddTask</a:t>
+            </a:r>
+            <a:r>
+              <a:rPr lang="en-US" sz="1800" dirty="0">
+                <a:latin typeface="Monaco"/>
+                <a:cs typeface="Monaco"/>
+              </a:rPr>
+              <a:t>(</a:t>
+            </a:r>
+            <a:r>
+              <a:rPr lang="en-US" sz="1800" dirty="0" err="1">
+                <a:latin typeface="Monaco"/>
+                <a:cs typeface="Monaco"/>
+              </a:rPr>
+              <a:t>ProcessImageTask</a:t>
+            </a:r>
+            <a:r>
+              <a:rPr lang="en-US" sz="1800" dirty="0">
+                <a:latin typeface="Monaco"/>
+                <a:cs typeface="Monaco"/>
+              </a:rPr>
+              <a:t>)</a:t>
+            </a:r>
+            <a:r>
+              <a:rPr lang="en-US" sz="1800" dirty="0" smtClean="0">
+                <a:latin typeface="Monaco"/>
+                <a:cs typeface="Monaco"/>
+              </a:rPr>
+              <a:t>:</a:t>
+            </a:r>
           </a:p>
           <a:p>
             <a:pPr marL="0" indent="0">
               <a:buNone/>
             </a:pPr>
             <a:r>
-              <a:rPr lang="en-US" b="1" dirty="0"/>
-              <a:t>Warning</a:t>
-            </a:r>
-            <a:r>
-              <a:rPr lang="en-US" dirty="0"/>
-              <a:t>: it is common for new command-line tasks to need new dataset types, because </a:t>
-            </a:r>
-            <a:r>
-              <a:rPr lang="en-US" dirty="0" err="1"/>
-              <a:t>CmdLineTask</a:t>
-            </a:r>
-            <a:r>
-              <a:rPr lang="en-US" dirty="0"/>
-              <a:t> saves configuration and metadata by default.</a:t>
-            </a:r>
+              <a:rPr lang="en-US" sz="1800" dirty="0">
+                <a:latin typeface="Monaco"/>
+                <a:cs typeface="Monaco"/>
+              </a:rPr>
+              <a:t> </a:t>
+            </a:r>
+            <a:r>
+              <a:rPr lang="en-US" sz="1800" dirty="0" smtClean="0">
+                <a:latin typeface="Monaco"/>
+                <a:cs typeface="Monaco"/>
+              </a:rPr>
+              <a:t>   …</a:t>
+            </a:r>
+            <a:endParaRPr lang="en-US" sz="1800" dirty="0">
+              <a:latin typeface="Monaco"/>
+              <a:cs typeface="Monaco"/>
+            </a:endParaRPr>
           </a:p>
           <a:p>
             <a:pPr marL="0" indent="0">
               <a:buNone/>
             </a:pPr>
-            <a:endParaRPr lang="en-US" dirty="0"/>
+            <a:r>
+              <a:rPr lang="en-US" sz="1800" dirty="0" smtClean="0">
+                <a:latin typeface="Monaco"/>
+                <a:cs typeface="Monaco"/>
+              </a:rPr>
+              <a:t>    @</a:t>
+            </a:r>
+            <a:r>
+              <a:rPr lang="en-US" sz="1800" dirty="0" err="1" smtClean="0">
+                <a:latin typeface="Monaco"/>
+                <a:cs typeface="Monaco"/>
+              </a:rPr>
+              <a:t>classmethod</a:t>
+            </a:r>
+            <a:endParaRPr lang="en-US" sz="1800" dirty="0" smtClean="0">
+              <a:latin typeface="Monaco"/>
+              <a:cs typeface="Monaco"/>
+            </a:endParaRPr>
           </a:p>
           <a:p>
             <a:pPr marL="0" indent="0">
               <a:buNone/>
             </a:pPr>
             <a:r>
-              <a:rPr lang="en-US" dirty="0"/>
-              <a:t>A planned butler rewrite will simplify the process of adding dataset types</a:t>
-            </a:r>
-            <a:r>
-              <a:rPr lang="en-US" dirty="0" smtClean="0"/>
-              <a:t>.</a:t>
-            </a:r>
-            <a:endParaRPr lang="en-US" dirty="0"/>
+              <a:rPr lang="en-US" sz="1800" dirty="0" smtClean="0">
+                <a:latin typeface="Monaco"/>
+                <a:cs typeface="Monaco"/>
+              </a:rPr>
+              <a:t>    </a:t>
+            </a:r>
+            <a:r>
+              <a:rPr lang="en-US" sz="1800" dirty="0" err="1" smtClean="0">
+                <a:latin typeface="Monaco"/>
+                <a:cs typeface="Monaco"/>
+              </a:rPr>
+              <a:t>def</a:t>
+            </a:r>
+            <a:r>
+              <a:rPr lang="en-US" sz="1800" dirty="0" smtClean="0">
+                <a:latin typeface="Monaco"/>
+                <a:cs typeface="Monaco"/>
+              </a:rPr>
+              <a:t> _</a:t>
+            </a:r>
+            <a:r>
+              <a:rPr lang="en-US" sz="1800" dirty="0" err="1" smtClean="0">
+                <a:latin typeface="Monaco"/>
+                <a:cs typeface="Monaco"/>
+              </a:rPr>
+              <a:t>makeArgumentParser</a:t>
+            </a:r>
+            <a:r>
+              <a:rPr lang="en-US" sz="1800" dirty="0" smtClean="0">
+                <a:latin typeface="Monaco"/>
+                <a:cs typeface="Monaco"/>
+              </a:rPr>
+              <a:t>(</a:t>
+            </a:r>
+            <a:r>
+              <a:rPr lang="en-US" sz="1800" dirty="0" err="1" smtClean="0">
+                <a:latin typeface="Monaco"/>
+                <a:cs typeface="Monaco"/>
+              </a:rPr>
+              <a:t>cls</a:t>
+            </a:r>
+            <a:r>
+              <a:rPr lang="en-US" sz="1800" dirty="0" smtClean="0">
+                <a:latin typeface="Monaco"/>
+                <a:cs typeface="Monaco"/>
+              </a:rPr>
+              <a:t>):</a:t>
+            </a:r>
+          </a:p>
+          <a:p>
+            <a:pPr marL="0" indent="0">
+              <a:buNone/>
+            </a:pPr>
+            <a:r>
+              <a:rPr lang="en-US" sz="1800" dirty="0" smtClean="0">
+                <a:latin typeface="Monaco"/>
+                <a:cs typeface="Monaco"/>
+              </a:rPr>
+              <a:t>        </a:t>
+            </a:r>
+            <a:r>
+              <a:rPr lang="en-US" sz="1800" dirty="0">
+                <a:latin typeface="Monaco"/>
+                <a:cs typeface="Monaco"/>
+              </a:rPr>
+              <a:t>parser = </a:t>
+            </a:r>
+            <a:r>
+              <a:rPr lang="en-US" sz="1800" dirty="0" err="1">
+                <a:latin typeface="Monaco"/>
+                <a:cs typeface="Monaco"/>
+              </a:rPr>
+              <a:t>ArgumentParser</a:t>
+            </a:r>
+            <a:r>
+              <a:rPr lang="en-US" sz="1800" dirty="0">
+                <a:latin typeface="Monaco"/>
+                <a:cs typeface="Monaco"/>
+              </a:rPr>
+              <a:t>(name=</a:t>
+            </a:r>
+            <a:r>
+              <a:rPr lang="en-US" sz="1800" dirty="0" err="1">
+                <a:latin typeface="Monaco"/>
+                <a:cs typeface="Monaco"/>
+              </a:rPr>
+              <a:t>cls</a:t>
+            </a:r>
+            <a:r>
+              <a:rPr lang="en-US" sz="1800" dirty="0">
+                <a:latin typeface="Monaco"/>
+                <a:cs typeface="Monaco"/>
+              </a:rPr>
+              <a:t>._</a:t>
+            </a:r>
+            <a:r>
+              <a:rPr lang="en-US" sz="1800" dirty="0" err="1">
+                <a:latin typeface="Monaco"/>
+                <a:cs typeface="Monaco"/>
+              </a:rPr>
+              <a:t>DefaultName</a:t>
+            </a:r>
+            <a:r>
+              <a:rPr lang="en-US" sz="1800" dirty="0">
+                <a:latin typeface="Monaco"/>
+                <a:cs typeface="Monaco"/>
+              </a:rPr>
+              <a:t>)</a:t>
+            </a:r>
+          </a:p>
+          <a:p>
+            <a:pPr marL="0" indent="0">
+              <a:buNone/>
+            </a:pPr>
+            <a:r>
+              <a:rPr lang="en-US" sz="1800" dirty="0">
+                <a:latin typeface="Monaco"/>
+                <a:cs typeface="Monaco"/>
+              </a:rPr>
+              <a:t>        </a:t>
+            </a:r>
+            <a:r>
+              <a:rPr lang="en-US" sz="1800" dirty="0" err="1">
+                <a:latin typeface="Monaco"/>
+                <a:cs typeface="Monaco"/>
+              </a:rPr>
+              <a:t>parser.add_id_argument</a:t>
+            </a:r>
+            <a:r>
+              <a:rPr lang="en-US" sz="1800" dirty="0">
+                <a:latin typeface="Monaco"/>
+                <a:cs typeface="Monaco"/>
+              </a:rPr>
+              <a:t>("--id”,</a:t>
+            </a:r>
+          </a:p>
+          <a:p>
+            <a:pPr marL="0" indent="0">
+              <a:buNone/>
+            </a:pPr>
+            <a:r>
+              <a:rPr lang="en-US" sz="1800" dirty="0">
+                <a:latin typeface="Monaco"/>
+                <a:cs typeface="Monaco"/>
+              </a:rPr>
+              <a:t>            </a:t>
+            </a:r>
+            <a:r>
+              <a:rPr lang="en-US" sz="1800" dirty="0" err="1">
+                <a:latin typeface="Monaco"/>
+                <a:cs typeface="Monaco"/>
+              </a:rPr>
+              <a:t>datasetType</a:t>
+            </a:r>
+            <a:r>
+              <a:rPr lang="en-US" sz="1800" dirty="0">
+                <a:latin typeface="Monaco"/>
+                <a:cs typeface="Monaco"/>
+              </a:rPr>
+              <a:t>="</a:t>
+            </a:r>
+            <a:r>
+              <a:rPr lang="en-US" sz="1800" b="1" dirty="0" err="1">
+                <a:latin typeface="Monaco"/>
+                <a:cs typeface="Monaco"/>
+              </a:rPr>
+              <a:t>deepCoadd</a:t>
+            </a:r>
+            <a:r>
+              <a:rPr lang="en-US" sz="1800" dirty="0">
+                <a:latin typeface="Monaco"/>
+                <a:cs typeface="Monaco"/>
+              </a:rPr>
+              <a:t>", help="data ID…",</a:t>
+            </a:r>
+          </a:p>
+          <a:p>
+            <a:pPr marL="0" indent="0">
+              <a:buNone/>
+            </a:pPr>
+            <a:r>
+              <a:rPr lang="en-US" sz="1800" dirty="0">
+                <a:latin typeface="Monaco"/>
+                <a:cs typeface="Monaco"/>
+              </a:rPr>
+              <a:t>            </a:t>
+            </a:r>
+            <a:r>
+              <a:rPr lang="en-US" sz="1800" b="1" dirty="0" err="1">
+                <a:latin typeface="Monaco"/>
+                <a:cs typeface="Monaco"/>
+              </a:rPr>
+              <a:t>ContainerClass</a:t>
+            </a:r>
+            <a:r>
+              <a:rPr lang="en-US" sz="1800" b="1" dirty="0">
+                <a:latin typeface="Monaco"/>
+                <a:cs typeface="Monaco"/>
+              </a:rPr>
+              <a:t>=</a:t>
+            </a:r>
+            <a:r>
+              <a:rPr lang="en-US" sz="1800" b="1" dirty="0" err="1">
+                <a:latin typeface="Monaco"/>
+                <a:cs typeface="Monaco"/>
+                <a:hlinkClick r:id="rId3"/>
+              </a:rPr>
+              <a:t>CoaddDataIdContainer</a:t>
+            </a:r>
+            <a:r>
+              <a:rPr lang="en-US" sz="1800" dirty="0">
+                <a:latin typeface="Monaco"/>
+                <a:cs typeface="Monaco"/>
+              </a:rPr>
+              <a:t>)</a:t>
+            </a:r>
+          </a:p>
+          <a:p>
+            <a:pPr marL="0" indent="0">
+              <a:buNone/>
+            </a:pPr>
+            <a:r>
+              <a:rPr lang="en-US" sz="1800" dirty="0">
+                <a:latin typeface="Monaco"/>
+                <a:cs typeface="Monaco"/>
+              </a:rPr>
+              <a:t>        return </a:t>
+            </a:r>
+            <a:r>
+              <a:rPr lang="en-US" sz="1800" dirty="0" smtClean="0">
+                <a:latin typeface="Monaco"/>
+                <a:cs typeface="Monaco"/>
+              </a:rPr>
+              <a:t>parser</a:t>
+            </a:r>
+            <a:endParaRPr lang="en-US" sz="1800" dirty="0">
+              <a:latin typeface="Monaco"/>
+              <a:cs typeface="Monaco"/>
+            </a:endParaRPr>
           </a:p>
         </p:txBody>
       </p:sp>
     </p:spTree>
     <p:extLst>
       <p:ext uri="{BB962C8B-B14F-4D97-AF65-F5344CB8AC3E}">
-        <p14:creationId xmlns:p14="http://schemas.microsoft.com/office/powerpoint/2010/main" val="2088089915"/>
+        <p14:creationId xmlns:p14="http://schemas.microsoft.com/office/powerpoint/2010/main" val="3384837500"/>
       </p:ext>
     </p:extLst>
   </p:cSld>
@@ -2295,7 +2601,7 @@
           <a:p>
             <a:r>
               <a:rPr lang="en-US" dirty="0" smtClean="0"/>
-              <a:t>Configuration</a:t>
+              <a:t>Argument Parser: Additional ID Arguments</a:t>
             </a:r>
             <a:endParaRPr lang="en-US" dirty="0"/>
           </a:p>
@@ -2316,104 +2622,429 @@
           <a:bodyPr/>
           <a:lstStyle/>
           <a:p>
-            <a:r>
-              <a:rPr lang="en-US" dirty="0" smtClean="0"/>
-              <a:t>Every task needs an associated configuration class, a subclass of </a:t>
-            </a:r>
-            <a:r>
-              <a:rPr lang="en-US" dirty="0" smtClean="0">
-                <a:hlinkClick r:id="rId2"/>
-              </a:rPr>
-              <a:t>lsst.pex.config.Config</a:t>
-            </a:r>
-            <a:endParaRPr lang="en-US" dirty="0" smtClean="0"/>
-          </a:p>
-          <a:p>
-            <a:r>
-              <a:rPr lang="en-US" dirty="0" smtClean="0"/>
-              <a:t>The configuration class has a field for each parameter and each subtask</a:t>
-            </a:r>
-          </a:p>
-          <a:p>
-            <a:r>
-              <a:rPr lang="en-US" dirty="0" smtClean="0"/>
-              <a:t>The task specifies its configuration class using class attribute </a:t>
-            </a:r>
-            <a:r>
-              <a:rPr lang="en-US" dirty="0" err="1" smtClean="0"/>
-              <a:t>ConfigClass</a:t>
-            </a:r>
-            <a:endParaRPr lang="en-US" dirty="0" smtClean="0"/>
-          </a:p>
-          <a:p>
-            <a:r>
-              <a:rPr lang="en-US" dirty="0" smtClean="0"/>
-              <a:t>To </a:t>
-            </a:r>
-            <a:r>
-              <a:rPr lang="en-US" dirty="0"/>
-              <a:t>check </a:t>
-            </a:r>
-            <a:r>
-              <a:rPr lang="en-US" dirty="0" smtClean="0"/>
-              <a:t>for </a:t>
-            </a:r>
-            <a:r>
-              <a:rPr lang="en-US" dirty="0"/>
-              <a:t>an invalid combination of </a:t>
-            </a:r>
-            <a:r>
-              <a:rPr lang="en-US" dirty="0" smtClean="0"/>
-              <a:t>parameters, add a </a:t>
-            </a:r>
-            <a:r>
-              <a:rPr lang="en-US" u="sng" dirty="0" smtClean="0"/>
-              <a:t>validate</a:t>
-            </a:r>
-            <a:r>
-              <a:rPr lang="en-US" dirty="0" smtClean="0"/>
-              <a:t> method</a:t>
-            </a:r>
-          </a:p>
-          <a:p>
-            <a:r>
-              <a:rPr lang="en-US" dirty="0" smtClean="0"/>
-              <a:t>To override default values of parameters in subtasks, add a </a:t>
-            </a:r>
-            <a:r>
-              <a:rPr lang="en-US" u="sng" dirty="0" err="1" smtClean="0"/>
-              <a:t>setDefaults</a:t>
-            </a:r>
-            <a:r>
-              <a:rPr lang="en-US" dirty="0" smtClean="0"/>
-              <a:t> method</a:t>
-            </a:r>
-          </a:p>
-          <a:p>
-            <a:endParaRPr lang="en-US" dirty="0" smtClean="0"/>
-          </a:p>
-          <a:p>
             <a:pPr marL="0" indent="0">
               <a:buNone/>
             </a:pPr>
             <a:r>
               <a:rPr lang="en-US" dirty="0" smtClean="0"/>
-              <a:t>Example: </a:t>
-            </a:r>
-            <a:r>
-              <a:rPr lang="en-US" dirty="0" smtClean="0">
-                <a:hlinkClick r:id="rId3"/>
-              </a:rPr>
-              <a:t>ProcessImageConfig</a:t>
-            </a:r>
-            <a:endParaRPr lang="en-US" dirty="0" smtClean="0"/>
+              <a:t>Obtaining </a:t>
+            </a:r>
+            <a:r>
+              <a:rPr lang="en-US" dirty="0"/>
+              <a:t>multiple data ID arguments takes a bit more work. You add an additional ID argument and provide a custom task runner (next slide). For example </a:t>
+            </a:r>
+            <a:r>
+              <a:rPr lang="en-US" dirty="0">
+                <a:hlinkClick r:id="rId2"/>
+              </a:rPr>
+              <a:t>AssembleCoaddTask</a:t>
+            </a:r>
+            <a:r>
+              <a:rPr lang="en-US" dirty="0"/>
+              <a:t> has two data ID arguments: </a:t>
+            </a:r>
+            <a:r>
+              <a:rPr lang="en-US" dirty="0" smtClean="0"/>
+              <a:t>--id specifies </a:t>
+            </a:r>
+            <a:r>
+              <a:rPr lang="en-US" dirty="0"/>
+              <a:t>the </a:t>
+            </a:r>
+            <a:r>
+              <a:rPr lang="en-US" dirty="0" err="1"/>
+              <a:t>coadd</a:t>
+            </a:r>
+            <a:r>
+              <a:rPr lang="en-US" dirty="0"/>
+              <a:t> tract and patch; </a:t>
+            </a:r>
+            <a:r>
+              <a:rPr lang="en-US" dirty="0" smtClean="0"/>
+              <a:t>--</a:t>
+            </a:r>
+            <a:r>
+              <a:rPr lang="en-US" dirty="0" err="1" smtClean="0"/>
+              <a:t>selectId</a:t>
+            </a:r>
+            <a:r>
+              <a:rPr lang="en-US" dirty="0" smtClean="0"/>
+              <a:t> specifies </a:t>
+            </a:r>
+            <a:r>
+              <a:rPr lang="en-US" dirty="0"/>
+              <a:t>a </a:t>
+            </a:r>
+            <a:r>
+              <a:rPr lang="en-US" dirty="0" err="1"/>
+              <a:t>coadd</a:t>
+            </a:r>
+            <a:r>
+              <a:rPr lang="en-US" dirty="0"/>
+              <a:t> temporary </a:t>
+            </a:r>
+            <a:r>
+              <a:rPr lang="en-US" dirty="0" smtClean="0"/>
+              <a:t>exposure:</a:t>
+            </a:r>
+          </a:p>
+          <a:p>
+            <a:pPr marL="0" indent="0">
+              <a:buNone/>
+            </a:pPr>
+            <a:endParaRPr lang="en-US" dirty="0"/>
+          </a:p>
+          <a:p>
+            <a:pPr marL="0" indent="0">
+              <a:buNone/>
+            </a:pPr>
+            <a:r>
+              <a:rPr lang="en-US" sz="1800" dirty="0">
+                <a:latin typeface="Monaco"/>
+                <a:cs typeface="Monaco"/>
+              </a:rPr>
+              <a:t> </a:t>
+            </a:r>
+            <a:r>
+              <a:rPr lang="en-US" sz="1800" dirty="0" smtClean="0">
+                <a:latin typeface="Monaco"/>
+                <a:cs typeface="Monaco"/>
+              </a:rPr>
+              <a:t>   @</a:t>
+            </a:r>
+            <a:r>
+              <a:rPr lang="en-US" sz="1800" dirty="0" err="1">
+                <a:latin typeface="Monaco"/>
+                <a:cs typeface="Monaco"/>
+              </a:rPr>
+              <a:t>classmethod</a:t>
+            </a:r>
+            <a:endParaRPr lang="en-US" sz="1800" dirty="0">
+              <a:latin typeface="Monaco"/>
+              <a:cs typeface="Monaco"/>
+            </a:endParaRPr>
+          </a:p>
+          <a:p>
+            <a:pPr marL="0" indent="0">
+              <a:buNone/>
+            </a:pPr>
+            <a:r>
+              <a:rPr lang="en-US" sz="1800" dirty="0">
+                <a:latin typeface="Monaco"/>
+                <a:cs typeface="Monaco"/>
+              </a:rPr>
+              <a:t>    </a:t>
+            </a:r>
+            <a:r>
+              <a:rPr lang="en-US" sz="1800" dirty="0" err="1">
+                <a:latin typeface="Monaco"/>
+                <a:cs typeface="Monaco"/>
+              </a:rPr>
+              <a:t>def</a:t>
+            </a:r>
+            <a:r>
+              <a:rPr lang="en-US" sz="1800" dirty="0">
+                <a:latin typeface="Monaco"/>
+                <a:cs typeface="Monaco"/>
+              </a:rPr>
+              <a:t> _</a:t>
+            </a:r>
+            <a:r>
+              <a:rPr lang="en-US" sz="1800" dirty="0" err="1">
+                <a:latin typeface="Monaco"/>
+                <a:cs typeface="Monaco"/>
+              </a:rPr>
+              <a:t>makeArgumentParser</a:t>
+            </a:r>
+            <a:r>
+              <a:rPr lang="en-US" sz="1800" dirty="0">
+                <a:latin typeface="Monaco"/>
+                <a:cs typeface="Monaco"/>
+              </a:rPr>
+              <a:t>(</a:t>
+            </a:r>
+            <a:r>
+              <a:rPr lang="en-US" sz="1800" dirty="0" err="1">
+                <a:latin typeface="Monaco"/>
+                <a:cs typeface="Monaco"/>
+              </a:rPr>
+              <a:t>cls</a:t>
+            </a:r>
+            <a:r>
+              <a:rPr lang="en-US" sz="1800" dirty="0">
+                <a:latin typeface="Monaco"/>
+                <a:cs typeface="Monaco"/>
+              </a:rPr>
+              <a:t>):</a:t>
+            </a:r>
+          </a:p>
+          <a:p>
+            <a:pPr marL="0" indent="0">
+              <a:buNone/>
+            </a:pPr>
+            <a:r>
+              <a:rPr lang="en-US" sz="1800" dirty="0" smtClean="0">
+                <a:latin typeface="Monaco"/>
+                <a:cs typeface="Monaco"/>
+              </a:rPr>
+              <a:t>        parser </a:t>
+            </a:r>
+            <a:r>
+              <a:rPr lang="en-US" sz="1800" dirty="0">
+                <a:latin typeface="Monaco"/>
+                <a:cs typeface="Monaco"/>
+              </a:rPr>
+              <a:t>= </a:t>
+            </a:r>
+            <a:r>
+              <a:rPr lang="en-US" sz="1800" dirty="0" err="1" smtClean="0">
+                <a:latin typeface="Monaco"/>
+                <a:cs typeface="Monaco"/>
+              </a:rPr>
+              <a:t>ArgumentParser</a:t>
+            </a:r>
+            <a:r>
+              <a:rPr lang="en-US" sz="1800" dirty="0">
+                <a:latin typeface="Monaco"/>
+                <a:cs typeface="Monaco"/>
+              </a:rPr>
+              <a:t>(name=</a:t>
+            </a:r>
+            <a:r>
+              <a:rPr lang="en-US" sz="1800" dirty="0" err="1">
+                <a:latin typeface="Monaco"/>
+                <a:cs typeface="Monaco"/>
+              </a:rPr>
+              <a:t>cls</a:t>
+            </a:r>
+            <a:r>
+              <a:rPr lang="en-US" sz="1800" dirty="0">
+                <a:latin typeface="Monaco"/>
+                <a:cs typeface="Monaco"/>
+              </a:rPr>
+              <a:t>._</a:t>
+            </a:r>
+            <a:r>
+              <a:rPr lang="en-US" sz="1800" dirty="0" err="1">
+                <a:latin typeface="Monaco"/>
+                <a:cs typeface="Monaco"/>
+              </a:rPr>
+              <a:t>DefaultName</a:t>
+            </a:r>
+            <a:r>
+              <a:rPr lang="en-US" sz="1800" dirty="0">
+                <a:latin typeface="Monaco"/>
+                <a:cs typeface="Monaco"/>
+              </a:rPr>
+              <a:t>)</a:t>
+            </a:r>
+          </a:p>
+          <a:p>
+            <a:pPr marL="0" indent="0">
+              <a:buNone/>
+            </a:pPr>
+            <a:r>
+              <a:rPr lang="en-US" sz="1800" dirty="0">
+                <a:latin typeface="Monaco"/>
+                <a:cs typeface="Monaco"/>
+              </a:rPr>
+              <a:t>        </a:t>
+            </a:r>
+            <a:r>
+              <a:rPr lang="en-US" sz="1800" b="1" dirty="0" err="1">
+                <a:latin typeface="Monaco"/>
+                <a:cs typeface="Monaco"/>
+              </a:rPr>
+              <a:t>parser.add_id_argument</a:t>
+            </a:r>
+            <a:r>
+              <a:rPr lang="en-US" sz="1800" b="1" dirty="0">
+                <a:latin typeface="Monaco"/>
+                <a:cs typeface="Monaco"/>
+              </a:rPr>
+              <a:t>("--</a:t>
+            </a:r>
+            <a:r>
+              <a:rPr lang="en-US" sz="1800" b="1" dirty="0" smtClean="0">
+                <a:latin typeface="Monaco"/>
+                <a:cs typeface="Monaco"/>
+              </a:rPr>
+              <a:t>id”, "</a:t>
+            </a:r>
+            <a:r>
+              <a:rPr lang="en-US" sz="1800" b="1" dirty="0" err="1" smtClean="0">
+                <a:latin typeface="Monaco"/>
+                <a:cs typeface="Monaco"/>
+              </a:rPr>
+              <a:t>deepCoadd_tempExp</a:t>
+            </a:r>
+            <a:r>
+              <a:rPr lang="en-US" sz="1800" b="1" dirty="0">
+                <a:latin typeface="Monaco"/>
+                <a:cs typeface="Monaco"/>
+              </a:rPr>
+              <a:t>",</a:t>
+            </a:r>
+          </a:p>
+          <a:p>
+            <a:pPr marL="0" indent="0">
+              <a:buNone/>
+            </a:pPr>
+            <a:r>
+              <a:rPr lang="en-US" sz="1800" b="1" dirty="0" smtClean="0">
+                <a:latin typeface="Monaco"/>
+                <a:cs typeface="Monaco"/>
+              </a:rPr>
+              <a:t>            </a:t>
+            </a:r>
+            <a:r>
+              <a:rPr lang="en-US" sz="1800" b="1" dirty="0" err="1" smtClean="0">
+                <a:latin typeface="Monaco"/>
+                <a:cs typeface="Monaco"/>
+              </a:rPr>
+              <a:t>ContainerClass</a:t>
+            </a:r>
+            <a:r>
+              <a:rPr lang="en-US" sz="1800" b="1" dirty="0">
+                <a:latin typeface="Monaco"/>
+                <a:cs typeface="Monaco"/>
+              </a:rPr>
+              <a:t>=</a:t>
+            </a:r>
+            <a:r>
+              <a:rPr lang="en-US" sz="1800" b="1" dirty="0" err="1">
+                <a:latin typeface="Monaco"/>
+                <a:cs typeface="Monaco"/>
+              </a:rPr>
+              <a:t>AssembleCoaddDataIdContainer</a:t>
+            </a:r>
+            <a:r>
+              <a:rPr lang="en-US" sz="1800" b="1" dirty="0">
+                <a:latin typeface="Monaco"/>
+                <a:cs typeface="Monaco"/>
+              </a:rPr>
+              <a:t>)</a:t>
+            </a:r>
+          </a:p>
+          <a:p>
+            <a:pPr marL="0" indent="0">
+              <a:buNone/>
+            </a:pPr>
+            <a:r>
+              <a:rPr lang="en-US" sz="1800" dirty="0">
+                <a:latin typeface="Monaco"/>
+                <a:cs typeface="Monaco"/>
+              </a:rPr>
+              <a:t>        </a:t>
+            </a:r>
+            <a:r>
+              <a:rPr lang="en-US" sz="1800" b="1" dirty="0" err="1">
+                <a:latin typeface="Monaco"/>
+                <a:cs typeface="Monaco"/>
+              </a:rPr>
+              <a:t>parser.add_id_argument</a:t>
+            </a:r>
+            <a:r>
+              <a:rPr lang="en-US" sz="1800" b="1" dirty="0">
+                <a:latin typeface="Monaco"/>
+                <a:cs typeface="Monaco"/>
+              </a:rPr>
+              <a:t>("--</a:t>
+            </a:r>
+            <a:r>
+              <a:rPr lang="en-US" sz="1800" b="1" dirty="0" err="1">
+                <a:latin typeface="Monaco"/>
+                <a:cs typeface="Monaco"/>
+              </a:rPr>
+              <a:t>selectId</a:t>
+            </a:r>
+            <a:r>
+              <a:rPr lang="en-US" sz="1800" b="1" dirty="0">
+                <a:latin typeface="Monaco"/>
+                <a:cs typeface="Monaco"/>
+              </a:rPr>
+              <a:t>", "</a:t>
+            </a:r>
+            <a:r>
+              <a:rPr lang="en-US" sz="1800" b="1" dirty="0" err="1">
+                <a:latin typeface="Monaco"/>
+                <a:cs typeface="Monaco"/>
+              </a:rPr>
+              <a:t>calexp</a:t>
+            </a:r>
+            <a:r>
+              <a:rPr lang="en-US" sz="1800" b="1" dirty="0">
+                <a:latin typeface="Monaco"/>
+                <a:cs typeface="Monaco"/>
+              </a:rPr>
+              <a:t>"</a:t>
+            </a:r>
+            <a:r>
+              <a:rPr lang="en-US" sz="1800" b="1" dirty="0" smtClean="0">
+                <a:latin typeface="Monaco"/>
+                <a:cs typeface="Monaco"/>
+              </a:rPr>
+              <a:t>,</a:t>
+            </a:r>
+          </a:p>
+          <a:p>
+            <a:pPr marL="0" indent="0">
+              <a:buNone/>
+            </a:pPr>
+            <a:r>
+              <a:rPr lang="en-US" sz="1800" b="1" dirty="0" smtClean="0">
+                <a:latin typeface="Monaco"/>
+                <a:cs typeface="Monaco"/>
+              </a:rPr>
+              <a:t>            </a:t>
+            </a:r>
+            <a:r>
+              <a:rPr lang="en-US" sz="1800" b="1" dirty="0" err="1" smtClean="0">
+                <a:latin typeface="Monaco"/>
+                <a:cs typeface="Monaco"/>
+              </a:rPr>
+              <a:t>ContainerClass</a:t>
+            </a:r>
+            <a:r>
+              <a:rPr lang="en-US" sz="1800" b="1" dirty="0">
+                <a:latin typeface="Monaco"/>
+                <a:cs typeface="Monaco"/>
+              </a:rPr>
+              <a:t>=</a:t>
+            </a:r>
+            <a:r>
+              <a:rPr lang="en-US" sz="1800" b="1" dirty="0" err="1">
+                <a:latin typeface="Monaco"/>
+                <a:cs typeface="Monaco"/>
+              </a:rPr>
+              <a:t>SelectDataIdContainer</a:t>
+            </a:r>
+            <a:r>
+              <a:rPr lang="en-US" sz="1800" b="1" dirty="0">
+                <a:latin typeface="Monaco"/>
+                <a:cs typeface="Monaco"/>
+              </a:rPr>
+              <a:t>)</a:t>
+            </a:r>
+          </a:p>
+          <a:p>
+            <a:pPr marL="0" indent="0">
+              <a:buNone/>
+            </a:pPr>
+            <a:r>
+              <a:rPr lang="en-US" sz="1800" dirty="0">
+                <a:latin typeface="Monaco"/>
+                <a:cs typeface="Monaco"/>
+              </a:rPr>
+              <a:t>        return parser</a:t>
+            </a:r>
           </a:p>
         </p:txBody>
       </p:sp>
     </p:spTree>
     <p:extLst>
       <p:ext uri="{BB962C8B-B14F-4D97-AF65-F5344CB8AC3E}">
-        <p14:creationId xmlns:p14="http://schemas.microsoft.com/office/powerpoint/2010/main" val="2629085479"/>
+        <p14:creationId xmlns:p14="http://schemas.microsoft.com/office/powerpoint/2010/main" val="100601060"/>
       </p:ext>
     </p:extLst>
   </p:cSld>
@@ -2457,7 +3088,7 @@
           <a:p>
             <a:r>
               <a:rPr lang="en-US" dirty="0" smtClean="0"/>
-              <a:t>The Future</a:t>
+              <a:t>Custom Task Runner for a Command-Line Task</a:t>
             </a:r>
             <a:endParaRPr lang="en-US" dirty="0"/>
           </a:p>
@@ -2483,6 +3114,297 @@
             </a:pPr>
             <a:r>
               <a:rPr lang="en-US" dirty="0" smtClean="0"/>
+              <a:t>The </a:t>
+            </a:r>
+            <a:r>
+              <a:rPr lang="en-US" dirty="0"/>
+              <a:t>default task runner calls </a:t>
+            </a:r>
+            <a:r>
+              <a:rPr lang="en-US" dirty="0" smtClean="0"/>
+              <a:t>your task’s </a:t>
+            </a:r>
+            <a:r>
+              <a:rPr lang="en-US" u="sng" dirty="0" smtClean="0"/>
+              <a:t>run</a:t>
+            </a:r>
+            <a:r>
+              <a:rPr lang="en-US" dirty="0" smtClean="0"/>
+              <a:t> method with a single argument: a data reference. </a:t>
+            </a:r>
+            <a:r>
+              <a:rPr lang="en-US" dirty="0"/>
+              <a:t>A custom task runner can provide additional </a:t>
+            </a:r>
+            <a:r>
+              <a:rPr lang="en-US" dirty="0" smtClean="0"/>
+              <a:t>or alternate arguments. For example:</a:t>
+            </a:r>
+            <a:endParaRPr lang="en-US" dirty="0" smtClean="0">
+              <a:hlinkClick r:id="rId2"/>
+            </a:endParaRPr>
+          </a:p>
+          <a:p>
+            <a:r>
+              <a:rPr lang="en-US" dirty="0" smtClean="0">
+                <a:hlinkClick r:id="rId2"/>
+              </a:rPr>
+              <a:t>CoaddBaseTask</a:t>
+            </a:r>
+            <a:r>
+              <a:rPr lang="en-US" dirty="0" smtClean="0"/>
+              <a:t> passes </a:t>
+            </a:r>
+            <a:r>
+              <a:rPr lang="en-US" dirty="0"/>
+              <a:t>an additional argument to run: </a:t>
+            </a:r>
+            <a:r>
+              <a:rPr lang="en-US" dirty="0" err="1" smtClean="0"/>
+              <a:t>parsedCmd.selectId.dataList</a:t>
+            </a:r>
+            <a:r>
+              <a:rPr lang="en-US" dirty="0" smtClean="0"/>
+              <a:t>. The change is trivial.</a:t>
+            </a:r>
+            <a:endParaRPr lang="en-US" dirty="0"/>
+          </a:p>
+          <a:p>
+            <a:r>
+              <a:rPr lang="en-US" dirty="0" smtClean="0">
+                <a:hlinkClick r:id="rId3"/>
+              </a:rPr>
+              <a:t>MakeSkyMapRunner</a:t>
+            </a:r>
+            <a:r>
+              <a:rPr lang="en-US" dirty="0" smtClean="0"/>
+              <a:t> calls </a:t>
+            </a:r>
+            <a:r>
+              <a:rPr lang="en-US" dirty="0"/>
+              <a:t>run with a butler, not a </a:t>
+            </a:r>
+            <a:r>
+              <a:rPr lang="en-US" dirty="0" err="1" smtClean="0"/>
+              <a:t>dataRef</a:t>
+            </a:r>
+            <a:r>
+              <a:rPr lang="en-US" dirty="0" smtClean="0"/>
+              <a:t>.</a:t>
+            </a:r>
+            <a:endParaRPr lang="en-US" dirty="0"/>
+          </a:p>
+          <a:p>
+            <a:endParaRPr lang="en-US" dirty="0"/>
+          </a:p>
+        </p:txBody>
+      </p:sp>
+    </p:spTree>
+    <p:extLst>
+      <p:ext uri="{BB962C8B-B14F-4D97-AF65-F5344CB8AC3E}">
+        <p14:creationId xmlns:p14="http://schemas.microsoft.com/office/powerpoint/2010/main" val="1499620307"/>
+      </p:ext>
+    </p:extLst>
+  </p:cSld>
+  <p:clrMapOvr>
+    <a:masterClrMapping/>
+  </p:clrMapOvr>
+</p:sld>
+</file>
+
+<file path=ppt/slides/slide13.xml><?xml version="1.0" encoding="utf-8"?>
+<p:sld xmlns:a="http://schemas.openxmlformats.org/drawingml/2006/main" xmlns:r="http://schemas.openxmlformats.org/officeDocument/2006/relationships" xmlns:p="http://schemas.openxmlformats.org/presentationml/2006/main">
+  <p:cSld>
+    <p:spTree>
+      <p:nvGrpSpPr>
+        <p:cNvPr id="1" name=""/>
+        <p:cNvGrpSpPr/>
+        <p:nvPr/>
+      </p:nvGrpSpPr>
+      <p:grpSpPr>
+        <a:xfrm>
+          <a:off x="0" y="0"/>
+          <a:ext cx="0" cy="0"/>
+          <a:chOff x="0" y="0"/>
+          <a:chExt cx="0" cy="0"/>
+        </a:xfrm>
+      </p:grpSpPr>
+      <p:sp>
+        <p:nvSpPr>
+          <p:cNvPr id="2" name="Title 1"/>
+          <p:cNvSpPr>
+            <a:spLocks noGrp="1"/>
+          </p:cNvSpPr>
+          <p:nvPr>
+            <p:ph type="title"/>
+          </p:nvPr>
+        </p:nvSpPr>
+        <p:spPr/>
+        <p:txBody>
+          <a:bodyPr/>
+          <a:lstStyle/>
+          <a:p>
+            <a:r>
+              <a:rPr lang="en-US" dirty="0" smtClean="0"/>
+              <a:t>New Dataset Types</a:t>
+            </a:r>
+            <a:endParaRPr lang="en-US" dirty="0"/>
+          </a:p>
+        </p:txBody>
+      </p:sp>
+      <p:sp>
+        <p:nvSpPr>
+          <p:cNvPr id="3" name="Text Placeholder 2"/>
+          <p:cNvSpPr>
+            <a:spLocks noGrp="1"/>
+          </p:cNvSpPr>
+          <p:nvPr>
+            <p:ph type="body" idx="1"/>
+          </p:nvPr>
+        </p:nvSpPr>
+        <p:spPr/>
+        <p:txBody>
+          <a:bodyPr/>
+          <a:lstStyle/>
+          <a:p>
+            <a:pPr marL="0" indent="0">
+              <a:buNone/>
+            </a:pPr>
+            <a:r>
+              <a:rPr lang="en-US" dirty="0" smtClean="0"/>
+              <a:t>At present each camera mapper provides a specific set of dataset types and if your task wants to write new kinds of data you will have to update the camera mapper for each camera you care about. Adding dataset types is discussed in the talk on </a:t>
+            </a:r>
+            <a:r>
+              <a:rPr lang="en-US" dirty="0" err="1" smtClean="0"/>
+              <a:t>obs</a:t>
+            </a:r>
+            <a:r>
+              <a:rPr lang="en-US" dirty="0" smtClean="0"/>
+              <a:t> packages.</a:t>
+            </a:r>
+          </a:p>
+          <a:p>
+            <a:pPr marL="0" indent="0">
+              <a:buNone/>
+            </a:pPr>
+            <a:endParaRPr lang="en-US" dirty="0"/>
+          </a:p>
+          <a:p>
+            <a:pPr marL="0" indent="0">
+              <a:buNone/>
+            </a:pPr>
+            <a:r>
+              <a:rPr lang="en-US" b="1" dirty="0"/>
+              <a:t>Warning</a:t>
+            </a:r>
+            <a:r>
+              <a:rPr lang="en-US" dirty="0"/>
+              <a:t>: it is common for new command-line tasks to need new dataset types, because </a:t>
+            </a:r>
+            <a:r>
+              <a:rPr lang="en-US" dirty="0" err="1"/>
+              <a:t>CmdLineTask</a:t>
+            </a:r>
+            <a:r>
+              <a:rPr lang="en-US" dirty="0"/>
+              <a:t> saves configuration and metadata by default.</a:t>
+            </a:r>
+          </a:p>
+          <a:p>
+            <a:pPr marL="0" indent="0">
+              <a:buNone/>
+            </a:pPr>
+            <a:endParaRPr lang="en-US" dirty="0"/>
+          </a:p>
+          <a:p>
+            <a:pPr marL="0" indent="0">
+              <a:buNone/>
+            </a:pPr>
+            <a:r>
+              <a:rPr lang="en-US" dirty="0"/>
+              <a:t>A planned butler rewrite will simplify the process of adding dataset types</a:t>
+            </a:r>
+            <a:r>
+              <a:rPr lang="en-US" dirty="0" smtClean="0"/>
+              <a:t>.</a:t>
+            </a:r>
+            <a:endParaRPr lang="en-US" dirty="0"/>
+          </a:p>
+        </p:txBody>
+      </p:sp>
+    </p:spTree>
+    <p:extLst>
+      <p:ext uri="{BB962C8B-B14F-4D97-AF65-F5344CB8AC3E}">
+        <p14:creationId xmlns:p14="http://schemas.microsoft.com/office/powerpoint/2010/main" val="2088089915"/>
+      </p:ext>
+    </p:extLst>
+  </p:cSld>
+  <p:clrMapOvr>
+    <a:masterClrMapping/>
+  </p:clrMapOvr>
+</p:sld>
+</file>
+
+<file path=ppt/slides/slide14.xml><?xml version="1.0" encoding="utf-8"?>
+<p:sld xmlns:a="http://schemas.openxmlformats.org/drawingml/2006/main" xmlns:r="http://schemas.openxmlformats.org/officeDocument/2006/relationships" xmlns:p="http://schemas.openxmlformats.org/presentationml/2006/main">
+  <p:cSld>
+    <p:spTree>
+      <p:nvGrpSpPr>
+        <p:cNvPr id="1" name=""/>
+        <p:cNvGrpSpPr/>
+        <p:nvPr/>
+      </p:nvGrpSpPr>
+      <p:grpSpPr>
+        <a:xfrm>
+          <a:off x="0" y="0"/>
+          <a:ext cx="0" cy="0"/>
+          <a:chOff x="0" y="0"/>
+          <a:chExt cx="0" cy="0"/>
+        </a:xfrm>
+      </p:grpSpPr>
+      <p:sp>
+        <p:nvSpPr>
+          <p:cNvPr id="2" name="Title 1"/>
+          <p:cNvSpPr>
+            <a:spLocks noGrp="1"/>
+          </p:cNvSpPr>
+          <p:nvPr>
+            <p:ph type="title"/>
+          </p:nvPr>
+        </p:nvSpPr>
+        <p:spPr/>
+        <p:txBody>
+          <a:bodyPr/>
+          <a:lstStyle/>
+          <a:p>
+            <a:r>
+              <a:rPr lang="en-US" dirty="0" smtClean="0"/>
+              <a:t>The Future</a:t>
+            </a:r>
+            <a:endParaRPr lang="en-US" dirty="0"/>
+          </a:p>
+        </p:txBody>
+      </p:sp>
+      <p:sp>
+        <p:nvSpPr>
+          <p:cNvPr id="3" name="Text Placeholder 2"/>
+          <p:cNvSpPr>
+            <a:spLocks noGrp="1"/>
+          </p:cNvSpPr>
+          <p:nvPr>
+            <p:ph type="body" idx="1"/>
+          </p:nvPr>
+        </p:nvSpPr>
+        <p:spPr/>
+        <p:txBody>
+          <a:bodyPr/>
+          <a:lstStyle/>
+          <a:p>
+            <a:pPr marL="0" indent="0">
+              <a:buNone/>
+            </a:pPr>
+            <a:r>
+              <a:rPr lang="en-US" dirty="0" smtClean="0"/>
               <a:t>Work </a:t>
             </a:r>
             <a:r>
@@ -2511,11 +3433,7 @@
           <a:p>
             <a:r>
               <a:rPr lang="en-US" dirty="0" smtClean="0"/>
-              <a:t>Make tasks useful in more contexts, such as data quality assessment and the science user </a:t>
-            </a:r>
-            <a:r>
-              <a:rPr lang="en-US" dirty="0" smtClean="0"/>
-              <a:t>interface</a:t>
+              <a:t>Make tasks useful in more contexts, such as data quality assessment and the science user interface</a:t>
             </a:r>
           </a:p>
           <a:p>
@@ -2527,13 +3445,17 @@
               <a:rPr lang="en-US" dirty="0" smtClean="0"/>
               <a:t>output</a:t>
             </a:r>
+          </a:p>
+          <a:p>
+            <a:r>
+              <a:rPr lang="en-US" dirty="0" smtClean="0"/>
+              <a:t>Make it easier to reproduce a given run by saving more information about </a:t>
+            </a:r>
+            <a:r>
+              <a:rPr lang="en-US" dirty="0" smtClean="0"/>
+              <a:t>each run</a:t>
+            </a:r>
             <a:endParaRPr lang="en-US" dirty="0" smtClean="0"/>
-          </a:p>
-          <a:p>
-            <a:r>
-              <a:rPr lang="en-US" dirty="0" smtClean="0"/>
-              <a:t>Make it easier to reproduce a given run by saving more information about each run</a:t>
-            </a:r>
           </a:p>
         </p:txBody>
       </p:sp>
@@ -3608,23 +4530,14 @@
             <p:ph type="title"/>
           </p:nvPr>
         </p:nvSpPr>
-        <p:spPr>
-          <a:xfrm>
-            <a:off x="228600" y="152400"/>
-            <a:ext cx="7162800" cy="557213"/>
-          </a:xfrm>
-        </p:spPr>
+        <p:spPr/>
         <p:txBody>
           <a:bodyPr/>
           <a:lstStyle/>
           <a:p>
             <a:r>
-              <a:rPr lang="en-US" dirty="0"/>
-              <a:t>Command-Line </a:t>
-            </a:r>
-            <a:r>
-              <a:rPr lang="en-US" dirty="0" smtClean="0"/>
-              <a:t>Task: Argument Parser</a:t>
+              <a:rPr lang="en-US" dirty="0" smtClean="0"/>
+              <a:t>Configuration</a:t>
             </a:r>
             <a:endParaRPr lang="en-US" dirty="0"/>
           </a:p>
@@ -3645,84 +4558,116 @@
           <a:bodyPr/>
           <a:lstStyle/>
           <a:p>
-            <a:pPr marL="0" indent="0">
-              <a:buNone/>
-            </a:pPr>
-            <a:r>
-              <a:rPr lang="en-US" dirty="0" smtClean="0"/>
-              <a:t>The default argument parser provides single raw images to your task. For anything else you must customize the argument parser. Here are two examples:</a:t>
-            </a:r>
-          </a:p>
-          <a:p>
-            <a:r>
-              <a:rPr lang="en-US" dirty="0" smtClean="0"/>
-              <a:t>Changing the image type is trivial. For example </a:t>
+            <a:r>
+              <a:rPr lang="en-US" dirty="0" smtClean="0"/>
+              <a:t>Every task needs an associated configuration class, a subclass of </a:t>
+            </a:r>
+            <a:r>
+              <a:rPr lang="en-US" dirty="0" smtClean="0">
+                <a:hlinkClick r:id="rId2"/>
+              </a:rPr>
+              <a:t>lsst.pex.config.Config</a:t>
+            </a:r>
+            <a:endParaRPr lang="en-US" dirty="0" smtClean="0"/>
+          </a:p>
+          <a:p>
+            <a:r>
+              <a:rPr lang="en-US" dirty="0" smtClean="0"/>
+              <a:t>The configuration class has a field for each parameter and each subtask</a:t>
+            </a:r>
+          </a:p>
+          <a:p>
+            <a:r>
+              <a:rPr lang="en-US" dirty="0" smtClean="0"/>
+              <a:t>The task specifies its configuration class using class attribute </a:t>
+            </a:r>
+            <a:r>
+              <a:rPr lang="en-US" dirty="0" err="1" smtClean="0"/>
+              <a:t>ConfigClass</a:t>
+            </a:r>
+            <a:endParaRPr lang="en-US" dirty="0" smtClean="0"/>
+          </a:p>
+          <a:p>
+            <a:r>
+              <a:rPr lang="en-US" dirty="0" smtClean="0"/>
+              <a:t>To </a:t>
+            </a:r>
+            <a:r>
+              <a:rPr lang="en-US" dirty="0"/>
+              <a:t>check </a:t>
+            </a:r>
+            <a:r>
+              <a:rPr lang="en-US" dirty="0" smtClean="0"/>
+              <a:t>for </a:t>
+            </a:r>
+            <a:r>
+              <a:rPr lang="en-US" dirty="0"/>
+              <a:t>an invalid combination of </a:t>
+            </a:r>
+            <a:r>
+              <a:rPr lang="en-US" dirty="0" smtClean="0"/>
+              <a:t>parameters, add a </a:t>
+            </a:r>
+            <a:r>
+              <a:rPr lang="en-US" u="sng" dirty="0" smtClean="0"/>
+              <a:t>validate</a:t>
+            </a:r>
+            <a:r>
+              <a:rPr lang="en-US" dirty="0" smtClean="0"/>
+              <a:t> method</a:t>
+            </a:r>
+          </a:p>
+          <a:p>
+            <a:r>
+              <a:rPr lang="en-US" dirty="0" smtClean="0"/>
+              <a:t>To override default values of parameters in subtasks, add a </a:t>
+            </a:r>
+            <a:r>
+              <a:rPr lang="en-US" u="sng" dirty="0" err="1" smtClean="0"/>
+              <a:t>setDefaults</a:t>
+            </a:r>
+            <a:r>
+              <a:rPr lang="en-US" dirty="0" smtClean="0"/>
+              <a:t> </a:t>
+            </a:r>
+            <a:r>
+              <a:rPr lang="en-US" dirty="0" smtClean="0"/>
+              <a:t>method</a:t>
+            </a:r>
+          </a:p>
+          <a:p>
+            <a:endParaRPr lang="en-US" dirty="0"/>
+          </a:p>
+          <a:p>
+            <a:r>
+              <a:rPr lang="en-US" dirty="0"/>
+              <a:t>Example </a:t>
+            </a:r>
+            <a:r>
+              <a:rPr lang="en-US" dirty="0" err="1"/>
+              <a:t>config</a:t>
+            </a:r>
+            <a:r>
+              <a:rPr lang="en-US" dirty="0"/>
+              <a:t>: </a:t>
             </a:r>
             <a:r>
               <a:rPr lang="en-US" dirty="0">
-                <a:hlinkClick r:id="rId2"/>
-              </a:rPr>
-              <a:t>ProcessCoaddTask</a:t>
-            </a:r>
-            <a:r>
-              <a:rPr lang="en-US" dirty="0"/>
-              <a:t> wants a </a:t>
-            </a:r>
-            <a:r>
-              <a:rPr lang="en-US" dirty="0" err="1" smtClean="0"/>
-              <a:t>coadd</a:t>
-            </a:r>
-            <a:r>
-              <a:rPr lang="en-US" dirty="0" smtClean="0"/>
-              <a:t>.</a:t>
-            </a:r>
-          </a:p>
-          <a:p>
-            <a:r>
-              <a:rPr lang="en-US" dirty="0" smtClean="0"/>
-              <a:t>Obtaining multiple </a:t>
-            </a:r>
-            <a:r>
-              <a:rPr lang="en-US" dirty="0"/>
-              <a:t>data ID </a:t>
-            </a:r>
-            <a:r>
-              <a:rPr lang="en-US" dirty="0" smtClean="0"/>
-              <a:t>arguments takes a bit more work. You add an additional ID argument and provide a custom task runner (next slide). For example </a:t>
-            </a:r>
-            <a:r>
-              <a:rPr lang="en-US" dirty="0" smtClean="0">
                 <a:hlinkClick r:id="rId3"/>
               </a:rPr>
-              <a:t>AssembleCoaddTask</a:t>
-            </a:r>
-            <a:r>
-              <a:rPr lang="en-US" dirty="0" smtClean="0"/>
-              <a:t> has two data ID arguments: one specifies the </a:t>
-            </a:r>
-            <a:r>
-              <a:rPr lang="en-US" dirty="0" err="1" smtClean="0"/>
-              <a:t>coadd</a:t>
-            </a:r>
-            <a:r>
-              <a:rPr lang="en-US" dirty="0" smtClean="0"/>
-              <a:t> tract and patch; the other specifies a </a:t>
-            </a:r>
-            <a:r>
-              <a:rPr lang="en-US" dirty="0" err="1" smtClean="0"/>
-              <a:t>coadd</a:t>
-            </a:r>
-            <a:r>
-              <a:rPr lang="en-US" dirty="0" smtClean="0"/>
-              <a:t> temporary exposures.</a:t>
-            </a:r>
+              <a:t>ProcessImageConfig</a:t>
+            </a:r>
+            <a:endParaRPr lang="en-US" dirty="0"/>
+          </a:p>
+          <a:p>
+            <a:endParaRPr lang="en-US" dirty="0" smtClean="0"/>
           </a:p>
         </p:txBody>
       </p:sp>
     </p:spTree>
     <p:extLst>
       <p:ext uri="{BB962C8B-B14F-4D97-AF65-F5344CB8AC3E}">
-        <p14:creationId xmlns:p14="http://schemas.microsoft.com/office/powerpoint/2010/main" val="1254859085"/>
+        <p14:creationId xmlns:p14="http://schemas.microsoft.com/office/powerpoint/2010/main" val="2629085479"/>
       </p:ext>
     </p:extLst>
   </p:cSld>
@@ -3759,14 +4704,23 @@
             <p:ph type="title"/>
           </p:nvPr>
         </p:nvSpPr>
-        <p:spPr/>
+        <p:spPr>
+          <a:xfrm>
+            <a:off x="228600" y="152400"/>
+            <a:ext cx="7162800" cy="557213"/>
+          </a:xfrm>
+        </p:spPr>
         <p:txBody>
           <a:bodyPr/>
           <a:lstStyle/>
           <a:p>
             <a:r>
-              <a:rPr lang="en-US" dirty="0" smtClean="0"/>
-              <a:t>Custom Task Runner for a Command-Line Task</a:t>
+              <a:rPr lang="en-US" dirty="0"/>
+              <a:t>Command-Line </a:t>
+            </a:r>
+            <a:r>
+              <a:rPr lang="en-US" dirty="0" smtClean="0"/>
+              <a:t>Task: Argument Parser</a:t>
             </a:r>
             <a:endParaRPr lang="en-US" dirty="0"/>
           </a:p>
@@ -3792,95 +4746,347 @@
             </a:pPr>
             <a:r>
               <a:rPr lang="en-US" dirty="0" smtClean="0"/>
-              <a:t>The </a:t>
+              <a:t>The default argument parser provides single raw images to your </a:t>
+            </a:r>
+            <a:r>
+              <a:rPr lang="en-US" dirty="0" smtClean="0"/>
+              <a:t>task. This is specified in </a:t>
+            </a:r>
+            <a:r>
+              <a:rPr lang="en-US" dirty="0" err="1" smtClean="0"/>
+              <a:t>CmdLineTask</a:t>
+            </a:r>
+            <a:r>
+              <a:rPr lang="en-US" dirty="0" smtClean="0"/>
+              <a:t>._</a:t>
+            </a:r>
+            <a:r>
+              <a:rPr lang="en-US" dirty="0" err="1" smtClean="0"/>
+              <a:t>makeArgumentParser</a:t>
             </a:r>
             <a:r>
               <a:rPr lang="en-US" dirty="0"/>
-              <a:t>default task runner calls </a:t>
-            </a:r>
-            <a:r>
-              <a:rPr lang="en-US" dirty="0" smtClean="0"/>
-              <a:t>your task’s </a:t>
-            </a:r>
-            <a:r>
-              <a:rPr lang="en-US" u="sng" dirty="0" smtClean="0"/>
-              <a:t>run</a:t>
-            </a:r>
-            <a:r>
-              <a:rPr lang="en-US" dirty="0" smtClean="0"/>
-              <a:t> method with a single argument: a data reference. </a:t>
+              <a:t>:</a:t>
+            </a:r>
+            <a:endParaRPr lang="en-US" dirty="0" smtClean="0"/>
+          </a:p>
+          <a:p>
+            <a:pPr marL="0" indent="0">
+              <a:buNone/>
+            </a:pPr>
+            <a:endParaRPr lang="en-US" sz="1800" dirty="0" smtClean="0">
+              <a:latin typeface=""/>
+            </a:endParaRPr>
+          </a:p>
+          <a:p>
+            <a:pPr marL="0" indent="0">
+              <a:buNone/>
+            </a:pPr>
+            <a:r>
+              <a:rPr lang="en-US" sz="1800" dirty="0" smtClean="0">
+                <a:latin typeface="Monaco"/>
+                <a:cs typeface="Monaco"/>
+              </a:rPr>
+              <a:t>    @</a:t>
+            </a:r>
+            <a:r>
+              <a:rPr lang="en-US" sz="1800" dirty="0" err="1">
+                <a:latin typeface="Monaco"/>
+                <a:cs typeface="Monaco"/>
+              </a:rPr>
+              <a:t>classmethod</a:t>
+            </a:r>
+            <a:endParaRPr lang="en-US" sz="1800" dirty="0">
+              <a:latin typeface="Monaco"/>
+              <a:cs typeface="Monaco"/>
+            </a:endParaRPr>
+          </a:p>
+          <a:p>
+            <a:pPr marL="0" indent="0">
+              <a:buNone/>
+            </a:pPr>
+            <a:r>
+              <a:rPr lang="en-US" sz="1800" dirty="0" smtClean="0">
+                <a:latin typeface="Monaco"/>
+                <a:cs typeface="Monaco"/>
+              </a:rPr>
+              <a:t>    </a:t>
+            </a:r>
+            <a:r>
+              <a:rPr lang="en-US" sz="1800" dirty="0" err="1" smtClean="0">
+                <a:latin typeface="Monaco"/>
+                <a:cs typeface="Monaco"/>
+              </a:rPr>
+              <a:t>def</a:t>
+            </a:r>
+            <a:r>
+              <a:rPr lang="en-US" sz="1800" dirty="0" smtClean="0">
+                <a:latin typeface="Monaco"/>
+                <a:cs typeface="Monaco"/>
+              </a:rPr>
+              <a:t> </a:t>
+            </a:r>
+            <a:r>
+              <a:rPr lang="en-US" sz="1800" dirty="0">
+                <a:latin typeface="Monaco"/>
+                <a:cs typeface="Monaco"/>
+              </a:rPr>
+              <a:t>_</a:t>
+            </a:r>
+            <a:r>
+              <a:rPr lang="en-US" sz="1800" dirty="0" err="1">
+                <a:latin typeface="Monaco"/>
+                <a:cs typeface="Monaco"/>
+              </a:rPr>
+              <a:t>makeArgumentParser</a:t>
+            </a:r>
+            <a:r>
+              <a:rPr lang="en-US" sz="1800" dirty="0">
+                <a:latin typeface="Monaco"/>
+                <a:cs typeface="Monaco"/>
+              </a:rPr>
+              <a:t>(</a:t>
+            </a:r>
+            <a:r>
+              <a:rPr lang="en-US" sz="1800" dirty="0" err="1">
+                <a:latin typeface="Monaco"/>
+                <a:cs typeface="Monaco"/>
+              </a:rPr>
+              <a:t>cls</a:t>
+            </a:r>
+            <a:r>
+              <a:rPr lang="en-US" sz="1800" dirty="0">
+                <a:latin typeface="Monaco"/>
+                <a:cs typeface="Monaco"/>
+              </a:rPr>
+              <a:t>):</a:t>
+            </a:r>
+          </a:p>
+          <a:p>
+            <a:pPr marL="0" indent="0">
+              <a:buNone/>
+            </a:pPr>
+            <a:r>
+              <a:rPr lang="en-US" sz="1800" dirty="0">
+                <a:latin typeface="Monaco"/>
+                <a:cs typeface="Monaco"/>
+              </a:rPr>
+              <a:t>    </a:t>
+            </a:r>
+            <a:r>
+              <a:rPr lang="en-US" sz="1800" dirty="0" smtClean="0">
+                <a:latin typeface="Monaco"/>
+                <a:cs typeface="Monaco"/>
+              </a:rPr>
+              <a:t>    parser </a:t>
+            </a:r>
+            <a:r>
+              <a:rPr lang="en-US" sz="1800" dirty="0">
+                <a:latin typeface="Monaco"/>
+                <a:cs typeface="Monaco"/>
+              </a:rPr>
+              <a:t>= </a:t>
+            </a:r>
+            <a:r>
+              <a:rPr lang="en-US" sz="1800" dirty="0" err="1">
+                <a:latin typeface="Monaco"/>
+                <a:cs typeface="Monaco"/>
+              </a:rPr>
+              <a:t>ArgumentParser</a:t>
+            </a:r>
+            <a:r>
+              <a:rPr lang="en-US" sz="1800" dirty="0">
+                <a:latin typeface="Monaco"/>
+                <a:cs typeface="Monaco"/>
+              </a:rPr>
+              <a:t>(name=</a:t>
+            </a:r>
+            <a:r>
+              <a:rPr lang="en-US" sz="1800" dirty="0" err="1">
+                <a:latin typeface="Monaco"/>
+                <a:cs typeface="Monaco"/>
+              </a:rPr>
+              <a:t>cls</a:t>
+            </a:r>
+            <a:r>
+              <a:rPr lang="en-US" sz="1800" dirty="0">
+                <a:latin typeface="Monaco"/>
+                <a:cs typeface="Monaco"/>
+              </a:rPr>
+              <a:t>._</a:t>
+            </a:r>
+            <a:r>
+              <a:rPr lang="en-US" sz="1800" dirty="0" err="1">
+                <a:latin typeface="Monaco"/>
+                <a:cs typeface="Monaco"/>
+              </a:rPr>
+              <a:t>DefaultName</a:t>
+            </a:r>
+            <a:r>
+              <a:rPr lang="en-US" sz="1800" dirty="0">
+                <a:latin typeface="Monaco"/>
+                <a:cs typeface="Monaco"/>
+              </a:rPr>
+              <a:t>)</a:t>
+            </a:r>
+          </a:p>
+          <a:p>
+            <a:pPr marL="0" indent="0">
+              <a:buNone/>
+            </a:pPr>
+            <a:r>
+              <a:rPr lang="en-US" sz="1800" dirty="0">
+                <a:latin typeface="Monaco"/>
+                <a:cs typeface="Monaco"/>
+              </a:rPr>
+              <a:t>    </a:t>
+            </a:r>
+            <a:r>
+              <a:rPr lang="en-US" sz="1800" dirty="0" smtClean="0">
+                <a:latin typeface="Monaco"/>
+                <a:cs typeface="Monaco"/>
+              </a:rPr>
+              <a:t>    </a:t>
+            </a:r>
+            <a:r>
+              <a:rPr lang="en-US" sz="1800" dirty="0" err="1" smtClean="0">
+                <a:latin typeface="Monaco"/>
+                <a:cs typeface="Monaco"/>
+              </a:rPr>
+              <a:t>parser.add_id_argument</a:t>
+            </a:r>
+            <a:r>
+              <a:rPr lang="en-US" sz="1800" dirty="0">
+                <a:latin typeface="Monaco"/>
+                <a:cs typeface="Monaco"/>
+              </a:rPr>
+              <a:t>(name="--</a:t>
+            </a:r>
+            <a:r>
+              <a:rPr lang="en-US" sz="1800" dirty="0" smtClean="0">
+                <a:latin typeface="Monaco"/>
+                <a:cs typeface="Monaco"/>
+              </a:rPr>
+              <a:t>id”,</a:t>
+            </a:r>
+          </a:p>
+          <a:p>
+            <a:pPr marL="0" indent="0">
+              <a:buNone/>
+            </a:pPr>
+            <a:r>
+              <a:rPr lang="en-US" sz="1800" dirty="0">
+                <a:latin typeface="Monaco"/>
+                <a:cs typeface="Monaco"/>
+              </a:rPr>
+              <a:t> </a:t>
+            </a:r>
+            <a:r>
+              <a:rPr lang="en-US" sz="1800" dirty="0" smtClean="0">
+                <a:latin typeface="Monaco"/>
+                <a:cs typeface="Monaco"/>
+              </a:rPr>
+              <a:t>           </a:t>
+            </a:r>
+            <a:r>
+              <a:rPr lang="en-US" sz="1800" dirty="0" err="1" smtClean="0">
+                <a:latin typeface="Monaco"/>
+                <a:cs typeface="Monaco"/>
+              </a:rPr>
+              <a:t>datasetType</a:t>
+            </a:r>
+            <a:r>
+              <a:rPr lang="en-US" sz="1800" dirty="0">
+                <a:latin typeface="Monaco"/>
+                <a:cs typeface="Monaco"/>
+              </a:rPr>
+              <a:t>="raw", help="data </a:t>
+            </a:r>
+            <a:r>
+              <a:rPr lang="en-US" sz="1800" dirty="0" smtClean="0">
+                <a:latin typeface="Monaco"/>
+                <a:cs typeface="Monaco"/>
+              </a:rPr>
+              <a:t>ID…"</a:t>
+            </a:r>
+            <a:r>
+              <a:rPr lang="en-US" sz="1800" dirty="0">
+                <a:latin typeface="Monaco"/>
+                <a:cs typeface="Monaco"/>
+              </a:rPr>
+              <a:t>)</a:t>
+            </a:r>
+          </a:p>
+          <a:p>
+            <a:pPr marL="0" indent="0">
+              <a:buNone/>
+            </a:pPr>
+            <a:r>
+              <a:rPr lang="en-US" sz="1800" dirty="0">
+                <a:latin typeface="Monaco"/>
+                <a:cs typeface="Monaco"/>
+              </a:rPr>
+              <a:t>    </a:t>
+            </a:r>
+            <a:r>
+              <a:rPr lang="en-US" sz="1800" dirty="0" smtClean="0">
+                <a:latin typeface="Monaco"/>
+                <a:cs typeface="Monaco"/>
+              </a:rPr>
+              <a:t>    return </a:t>
+            </a:r>
+            <a:r>
+              <a:rPr lang="en-US" sz="1800" dirty="0">
+                <a:latin typeface="Monaco"/>
+                <a:cs typeface="Monaco"/>
+              </a:rPr>
+              <a:t>parser</a:t>
+            </a:r>
+          </a:p>
+          <a:p>
+            <a:pPr marL="0" indent="0">
+              <a:buNone/>
+            </a:pPr>
+            <a:endParaRPr lang="en-US" dirty="0" smtClean="0"/>
+          </a:p>
+          <a:p>
+            <a:pPr marL="0" indent="0">
+              <a:buNone/>
+            </a:pPr>
+            <a:r>
+              <a:rPr lang="en-US" dirty="0" smtClean="0"/>
+              <a:t>For </a:t>
+            </a:r>
+            <a:r>
+              <a:rPr lang="en-US" dirty="0" smtClean="0"/>
+              <a:t>anything else you must customize the argument </a:t>
+            </a:r>
+            <a:r>
+              <a:rPr lang="en-US" dirty="0" smtClean="0"/>
+              <a:t>parser.</a:t>
             </a:r>
             <a:r>
               <a:rPr lang="en-US" dirty="0"/>
-              <a:t>A custom task runner can provide additional </a:t>
-            </a:r>
-            <a:r>
-              <a:rPr lang="en-US" dirty="0" smtClean="0"/>
-              <a:t>or alternate arguments. For example:</a:t>
-            </a:r>
-            <a:endParaRPr lang="en-US" dirty="0" smtClean="0">
-              <a:hlinkClick r:id="rId2"/>
-            </a:endParaRPr>
-          </a:p>
-          <a:p>
-            <a:r>
-              <a:rPr lang="en-US" dirty="0" smtClean="0">
-                <a:hlinkClick r:id="rId2"/>
-              </a:rPr>
-              <a:t>CoaddBaseTask</a:t>
-            </a:r>
-            <a:r>
-              <a:rPr lang="en-US" dirty="0" smtClean="0"/>
-              <a:t> passes </a:t>
-            </a:r>
-            <a:r>
-              <a:rPr lang="en-US" dirty="0"/>
-              <a:t>an additional argument to run: </a:t>
-            </a:r>
-            <a:r>
-              <a:rPr lang="en-US" dirty="0" err="1" smtClean="0"/>
-              <a:t>parsedCmd.selectId.dataList</a:t>
-            </a:r>
-            <a:r>
-              <a:rPr lang="en-US" dirty="0" smtClean="0"/>
-              <a:t>. The change is trivial.</a:t>
-            </a:r>
-            <a:endParaRPr lang="en-US" dirty="0"/>
-          </a:p>
-          <a:p>
-            <a:r>
-              <a:rPr lang="en-US" dirty="0" smtClean="0">
-                <a:hlinkClick r:id="rId3"/>
-              </a:rPr>
-              <a:t>MakeSkyMapRunner</a:t>
-            </a:r>
-            <a:r>
-              <a:rPr lang="en-US" dirty="0" smtClean="0"/>
-              <a:t> calls </a:t>
-            </a:r>
-            <a:r>
-              <a:rPr lang="en-US" dirty="0"/>
-              <a:t>run with a butler, not a </a:t>
-            </a:r>
-            <a:r>
-              <a:rPr lang="en-US" dirty="0" err="1" smtClean="0"/>
-              <a:t>dataRef</a:t>
-            </a:r>
-            <a:r>
-              <a:rPr lang="en-US" dirty="0" smtClean="0"/>
-              <a:t>.</a:t>
-            </a:r>
-            <a:endParaRPr lang="en-US" dirty="0"/>
-          </a:p>
-          <a:p>
-            <a:endParaRPr lang="en-US" dirty="0"/>
+              <a:t> </a:t>
+            </a:r>
+            <a:endParaRPr lang="en-US" dirty="0" smtClean="0"/>
+          </a:p>
+          <a:p>
+            <a:pPr marL="0" indent="0">
+              <a:buNone/>
+            </a:pPr>
+            <a:r>
+              <a:rPr lang="en-US" dirty="0" smtClean="0"/>
+              <a:t>The following slides give two examples.</a:t>
+            </a:r>
+            <a:endParaRPr lang="en-US" dirty="0" smtClean="0"/>
           </a:p>
         </p:txBody>
       </p:sp>
     </p:spTree>
     <p:extLst>
       <p:ext uri="{BB962C8B-B14F-4D97-AF65-F5344CB8AC3E}">
-        <p14:creationId xmlns:p14="http://schemas.microsoft.com/office/powerpoint/2010/main" val="1499620307"/>
+        <p14:creationId xmlns:p14="http://schemas.microsoft.com/office/powerpoint/2010/main" val="1254859085"/>
       </p:ext>
     </p:extLst>
   </p:cSld>

</xml_diff>